<commit_message>
update for github org name change (ucl to uclh)
</commit_message>
<xml_diff>
--- a/sessions/0-welcome.pptx
+++ b/sessions/0-welcome.pptx
@@ -3846,7 +3846,7 @@
             </a:r>
             <a:r>
               <a:rPr/>
-              <a:t> for tracking progress, entering questions etc.  </a:t>
+              <a:t> for tracking progress, entering questions etc.</a:t>
             </a:r>
           </a:p>
           <a:p>
@@ -3863,7 +3863,7 @@
             </a:r>
             <a:r>
               <a:rPr/>
-              <a:t> you should have been sent password, let us know if not.  </a:t>
+              <a:t> you should have been sent password, let us know if not.</a:t>
             </a:r>
           </a:p>
           <a:p>

</xml_diff>

<commit_message>
migrate from Server to Data Science Desktop fixing #7
</commit_message>
<xml_diff>
--- a/sessions/0-welcome.pptx
+++ b/sessions/0-welcome.pptx
@@ -3853,17 +3853,13 @@
             <a:pPr lvl="1"/>
             <a:r>
               <a:rPr/>
-              <a:t>access R online: </a:t>
+              <a:t>access UCLH Data Science desktop you should have received this link, let us know if you don’t have access. </a:t>
             </a:r>
             <a:r>
               <a:rPr>
                 <a:hlinkClick r:id="rId3"/>
               </a:rPr>
-              <a:t>http://uclvldddtaeas01.xuclh.nhs.uk:4433</a:t>
-            </a:r>
-            <a:r>
-              <a:rPr/>
-              <a:t> you should have been sent password, let us know if not.</a:t>
+              <a:t>https://github.com/uclh-criu/learning-datascience/blob/master/Instructions/01-pre-course-instructions.md</a:t>
             </a:r>
           </a:p>
           <a:p>

</xml_diff>

<commit_message>
ocd convert folder names to consistent lowercase
</commit_message>
<xml_diff>
--- a/sessions/0-welcome.pptx
+++ b/sessions/0-welcome.pptx
@@ -12,6 +12,7 @@
     <p:sldId id="260" r:id="rId6"/>
     <p:sldId id="261" r:id="rId7"/>
     <p:sldId id="262" r:id="rId8"/>
+    <p:sldId id="263" r:id="rId9"/>
   </p:sldIdLst>
   <p:sldSz cx="12192000" cy="6858000"/>
   <p:notesSz cx="6858000" cy="9144000"/>
@@ -3482,7 +3483,7 @@
       </p:grpSpPr>
       <p:pic>
         <p:nvPicPr>
-          <p:cNvPr descr="../Images/UCLH-logo-colour-scaled.jpg" id="0" name="Picture 1"/>
+          <p:cNvPr descr="../images/UCLH-logo-colour-scaled.jpg" id="0" name="Picture 1"/>
           <p:cNvPicPr>
             <a:picLocks noGrp="1" noChangeAspect="1"/>
           </p:cNvPicPr>
@@ -3757,6 +3758,14 @@
               <a:t>a few sentences each, start with instructors</a:t>
             </a:r>
           </a:p>
+          <a:p>
+            <a:pPr lvl="0" marL="0" indent="0">
+              <a:spcBef>
+                <a:spcPts val="3000"/>
+              </a:spcBef>
+              <a:buNone/>
+            </a:pPr>
+          </a:p>
         </p:txBody>
       </p:sp>
     </p:spTree>
@@ -3781,144 +3790,36 @@
           <a:chExt cx="0" cy="0"/>
         </a:xfrm>
       </p:grpSpPr>
-      <p:sp>
-        <p:nvSpPr>
-          <p:cNvPr id="2" name="Title 1">
-            <a:extLst>
-              <a:ext uri="{FF2B5EF4-FFF2-40B4-BE49-F238E27FC236}">
-                <a16:creationId xmlns:a16="http://schemas.microsoft.com/office/drawing/2014/main" id="{5567D468-EE70-CD4E-A3AC-039CC11EF1FB}"/>
-              </a:ext>
-            </a:extLst>
-          </p:cNvPr>
-          <p:cNvSpPr>
-            <a:spLocks noGrp="1"/>
-          </p:cNvSpPr>
-          <p:nvPr>
-            <p:ph type="title"/>
-          </p:nvPr>
-        </p:nvSpPr>
-        <p:spPr/>
-        <p:txBody>
-          <a:bodyPr/>
-          <a:lstStyle/>
-          <a:p>
-            <a:pPr lvl="0" marL="0" indent="0">
-              <a:buNone/>
-            </a:pPr>
-            <a:r>
-              <a:rPr/>
-              <a:t>Pre-requisites</a:t>
-            </a:r>
-          </a:p>
-        </p:txBody>
-      </p:sp>
-      <p:sp>
-        <p:nvSpPr>
-          <p:cNvPr id="3" name="Content Placeholder 2">
-            <a:extLst>
-              <a:ext uri="{FF2B5EF4-FFF2-40B4-BE49-F238E27FC236}">
-                <a16:creationId xmlns:a16="http://schemas.microsoft.com/office/drawing/2014/main" id="{D10DDA37-E46B-B641-BC9F-636CB92A2C08}"/>
-              </a:ext>
-            </a:extLst>
-          </p:cNvPr>
-          <p:cNvSpPr>
-            <a:spLocks noGrp="1"/>
-          </p:cNvSpPr>
-          <p:nvPr>
-            <p:ph idx="1"/>
-          </p:nvPr>
-        </p:nvSpPr>
-        <p:spPr/>
-        <p:txBody>
-          <a:bodyPr/>
-          <a:lstStyle/>
-          <a:p>
-            <a:pPr lvl="1"/>
-            <a:r>
-              <a:rPr/>
-              <a:t>Access </a:t>
-            </a:r>
-            <a:r>
-              <a:rPr>
-                <a:hlinkClick r:id="rId2"/>
-              </a:rPr>
-              <a:t>Collaborative document</a:t>
-            </a:r>
-            <a:r>
-              <a:rPr/>
-              <a:t> for tracking progress, entering questions etc.</a:t>
-            </a:r>
-          </a:p>
-          <a:p>
-            <a:pPr lvl="1"/>
-            <a:r>
-              <a:rPr/>
-              <a:t>access UCLH Data Science desktop you should have received this link, let us know if you don’t have access. </a:t>
-            </a:r>
-            <a:r>
-              <a:rPr>
-                <a:hlinkClick r:id="rId3"/>
-              </a:rPr>
-              <a:t>https://github.com/uclh-criu/learning-datascience/blob/master/Instructions/01-pre-course-instructions.md</a:t>
-            </a:r>
-          </a:p>
-          <a:p>
-            <a:pPr lvl="1"/>
-            <a:r>
-              <a:rPr/>
-              <a:t>Backup plan : if need to run locally download </a:t>
-            </a:r>
-            <a:r>
-              <a:rPr>
-                <a:hlinkClick r:id="rId4"/>
-              </a:rPr>
-              <a:t>R</a:t>
-            </a:r>
-            <a:r>
-              <a:rPr/>
-              <a:t> &amp; </a:t>
-            </a:r>
-            <a:r>
-              <a:rPr>
-                <a:hlinkClick r:id="rId5"/>
-              </a:rPr>
-              <a:t>RStudio</a:t>
-            </a:r>
-          </a:p>
-          <a:p>
-            <a:pPr lvl="0" marL="0" indent="0">
-              <a:spcBef>
-                <a:spcPts val="3000"/>
-              </a:spcBef>
-              <a:buNone/>
-            </a:pPr>
-            <a:r>
-              <a:rPr b="1"/>
-              <a:t>Course schedule</a:t>
-            </a:r>
-          </a:p>
-          <a:p>
-            <a:pPr lvl="1"/>
-            <a:r>
-              <a:rPr/>
-              <a:t>2 days of intensive learning </a:t>
-            </a:r>
-            <a:r>
-              <a:rPr>
-                <a:hlinkClick r:id="rId6"/>
-              </a:rPr>
-              <a:t>link to schedule</a:t>
-            </a:r>
-          </a:p>
-          <a:p>
-            <a:pPr lvl="1"/>
-            <a:r>
-              <a:rPr/>
-              <a:t>we will be flexible &amp; adapt as needed</a:t>
-            </a:r>
-          </a:p>
-        </p:txBody>
-      </p:sp>
+      <p:pic>
+        <p:nvPicPr>
+          <p:cNvPr descr="../images/uclh-desktops.png" id="0" name="Picture 1"/>
+          <p:cNvPicPr>
+            <a:picLocks noGrp="1" noChangeAspect="1"/>
+          </p:cNvPicPr>
+          <p:nvPr/>
+        </p:nvPicPr>
+        <p:blipFill>
+          <a:blip r:embed="rId2"/>
+          <a:stretch>
+            <a:fillRect/>
+          </a:stretch>
+        </p:blipFill>
+        <p:spPr bwMode="auto">
+          <a:xfrm>
+            <a:off x="838200" y="2171700"/>
+            <a:ext cx="10515600" cy="3619500"/>
+          </a:xfrm>
+          <a:prstGeom prst="rect">
+            <a:avLst/>
+          </a:prstGeom>
+          <a:noFill/>
+          <a:ln w="9525">
+            <a:noFill/>
+            <a:headEnd/>
+            <a:tailEnd/>
+          </a:ln>
+        </p:spPr>
+      </p:pic>
     </p:spTree>
   </p:cSld>
 </p:sld>
@@ -3967,47 +3868,7 @@
             </a:pPr>
             <a:r>
               <a:rPr/>
-              <a:t>What</a:t>
-            </a:r>
-            <a:r>
-              <a:rPr/>
-              <a:t> </a:t>
-            </a:r>
-            <a:r>
-              <a:rPr/>
-              <a:t>to</a:t>
-            </a:r>
-            <a:r>
-              <a:rPr/>
-              <a:t> </a:t>
-            </a:r>
-            <a:r>
-              <a:rPr/>
-              <a:t>expect</a:t>
-            </a:r>
-            <a:r>
-              <a:rPr/>
-              <a:t> </a:t>
-            </a:r>
-            <a:r>
-              <a:rPr/>
-              <a:t>from</a:t>
-            </a:r>
-            <a:r>
-              <a:rPr/>
-              <a:t> </a:t>
-            </a:r>
-            <a:r>
-              <a:rPr/>
-              <a:t>the</a:t>
-            </a:r>
-            <a:r>
-              <a:rPr/>
-              <a:t> </a:t>
-            </a:r>
-            <a:r>
-              <a:rPr/>
-              <a:t>sessions</a:t>
+              <a:t>Pre-requisites</a:t>
             </a:r>
           </a:p>
         </p:txBody>
@@ -4036,64 +3897,90 @@
             <a:pPr lvl="1"/>
             <a:r>
               <a:rPr/>
-              <a:t>we will follow a learning by doing approach</a:t>
+              <a:t>UCLH Data Science desktop. You should have received this link, let us know if you don’t have access.</a:t>
+            </a:r>
+          </a:p>
+          <a:p>
+            <a:pPr lvl="0" marL="0" indent="0">
+              <a:buNone/>
+            </a:pPr>
+            <a:r>
+              <a:rPr>
+                <a:hlinkClick r:id="rId2"/>
+              </a:rPr>
+              <a:t>https://github.com/uclh-criu/learning-datascience/blob/master/instructions/01-pre-course-instructions.md</a:t>
             </a:r>
           </a:p>
           <a:p>
             <a:pPr lvl="1"/>
             <a:r>
               <a:rPr/>
-              <a:t>getting you interacting with R early</a:t>
+              <a:t>Access </a:t>
+            </a:r>
+            <a:r>
+              <a:rPr>
+                <a:hlinkClick r:id="rId3"/>
+              </a:rPr>
+              <a:t>Collaborative document</a:t>
+            </a:r>
+            <a:r>
+              <a:rPr/>
+              <a:t> for tracking progress, entering questions etc.</a:t>
             </a:r>
           </a:p>
           <a:p>
             <a:pPr lvl="1"/>
             <a:r>
               <a:rPr/>
-              <a:t>don’t worry if you don’t understand everything at the start</a:t>
+              <a:t>Backup plan : if need to run locally download </a:t>
+            </a:r>
+            <a:r>
+              <a:rPr>
+                <a:hlinkClick r:id="rId4"/>
+              </a:rPr>
+              <a:t>R</a:t>
+            </a:r>
+            <a:r>
+              <a:rPr/>
+              <a:t> &amp; </a:t>
+            </a:r>
+            <a:r>
+              <a:rPr>
+                <a:hlinkClick r:id="rId5"/>
+              </a:rPr>
+              <a:t>RStudio</a:t>
+            </a:r>
+          </a:p>
+          <a:p>
+            <a:pPr lvl="0" marL="0" indent="0">
+              <a:spcBef>
+                <a:spcPts val="3000"/>
+              </a:spcBef>
+              <a:buNone/>
+            </a:pPr>
+            <a:r>
+              <a:rPr b="1"/>
+              <a:t>Course schedule</a:t>
             </a:r>
           </a:p>
           <a:p>
             <a:pPr lvl="1"/>
             <a:r>
               <a:rPr/>
-              <a:t>do feel free to ask us questions at any time</a:t>
-            </a:r>
-          </a:p>
-          <a:p>
-            <a:pPr lvl="0" marL="0" indent="0">
-              <a:buNone/>
-            </a:pPr>
-            <a:r>
-              <a:rPr/>
-              <a:t>I expect to fail to avoid doing these at some point :</a:t>
-            </a:r>
-          </a:p>
-          <a:p>
-            <a:pPr lvl="1">
-              <a:buAutoNum type="alphaLcParenR"/>
-            </a:pPr>
-            <a:r>
-              <a:rPr/>
-              <a:t>assume you know things that you don’t</a:t>
-            </a:r>
-          </a:p>
-          <a:p>
-            <a:pPr lvl="1">
-              <a:buAutoNum type="alphaLcParenR"/>
-            </a:pPr>
-            <a:r>
-              <a:rPr/>
-              <a:t>patronise you by explaining things you already know</a:t>
-            </a:r>
-          </a:p>
-          <a:p>
-            <a:pPr lvl="0" marL="0" indent="0">
-              <a:buNone/>
-            </a:pPr>
-            <a:r>
-              <a:rPr/>
-              <a:t>Please feel free to tell me.</a:t>
+              <a:t>2 days of intensive learning </a:t>
+            </a:r>
+            <a:r>
+              <a:rPr>
+                <a:hlinkClick r:id="rId6"/>
+              </a:rPr>
+              <a:t>link to schedule</a:t>
+            </a:r>
+          </a:p>
+          <a:p>
+            <a:pPr lvl="1"/>
+            <a:r>
+              <a:rPr/>
+              <a:t>we will be flexible &amp; adapt as needed</a:t>
             </a:r>
           </a:p>
         </p:txBody>
@@ -4104,6 +3991,185 @@
 </file>
 
 <file path=ppt/slides/slide7.xml><?xml version="1.0" encoding="utf-8"?>
+<p:sld xmlns:a="http://schemas.openxmlformats.org/drawingml/2006/main" xmlns:r="http://schemas.openxmlformats.org/officeDocument/2006/relationships" xmlns:p="http://schemas.openxmlformats.org/presentationml/2006/main">
+  <p:cSld>
+    <p:spTree>
+      <p:nvGrpSpPr>
+        <p:cNvPr id="1" name=""/>
+        <p:cNvGrpSpPr/>
+        <p:nvPr/>
+      </p:nvGrpSpPr>
+      <p:grpSpPr>
+        <a:xfrm>
+          <a:off x="0" y="0"/>
+          <a:ext cx="0" cy="0"/>
+          <a:chOff x="0" y="0"/>
+          <a:chExt cx="0" cy="0"/>
+        </a:xfrm>
+      </p:grpSpPr>
+      <p:sp>
+        <p:nvSpPr>
+          <p:cNvPr id="2" name="Title 1">
+            <a:extLst>
+              <a:ext uri="{FF2B5EF4-FFF2-40B4-BE49-F238E27FC236}">
+                <a16:creationId xmlns:a16="http://schemas.microsoft.com/office/drawing/2014/main" id="{5567D468-EE70-CD4E-A3AC-039CC11EF1FB}"/>
+              </a:ext>
+            </a:extLst>
+          </p:cNvPr>
+          <p:cNvSpPr>
+            <a:spLocks noGrp="1"/>
+          </p:cNvSpPr>
+          <p:nvPr>
+            <p:ph type="title"/>
+          </p:nvPr>
+        </p:nvSpPr>
+        <p:spPr/>
+        <p:txBody>
+          <a:bodyPr/>
+          <a:lstStyle/>
+          <a:p>
+            <a:pPr lvl="0" marL="0" indent="0">
+              <a:buNone/>
+            </a:pPr>
+            <a:r>
+              <a:rPr/>
+              <a:t>What</a:t>
+            </a:r>
+            <a:r>
+              <a:rPr/>
+              <a:t> </a:t>
+            </a:r>
+            <a:r>
+              <a:rPr/>
+              <a:t>to</a:t>
+            </a:r>
+            <a:r>
+              <a:rPr/>
+              <a:t> </a:t>
+            </a:r>
+            <a:r>
+              <a:rPr/>
+              <a:t>expect</a:t>
+            </a:r>
+            <a:r>
+              <a:rPr/>
+              <a:t> </a:t>
+            </a:r>
+            <a:r>
+              <a:rPr/>
+              <a:t>from</a:t>
+            </a:r>
+            <a:r>
+              <a:rPr/>
+              <a:t> </a:t>
+            </a:r>
+            <a:r>
+              <a:rPr/>
+              <a:t>the</a:t>
+            </a:r>
+            <a:r>
+              <a:rPr/>
+              <a:t> </a:t>
+            </a:r>
+            <a:r>
+              <a:rPr/>
+              <a:t>sessions</a:t>
+            </a:r>
+          </a:p>
+        </p:txBody>
+      </p:sp>
+      <p:sp>
+        <p:nvSpPr>
+          <p:cNvPr id="3" name="Content Placeholder 2">
+            <a:extLst>
+              <a:ext uri="{FF2B5EF4-FFF2-40B4-BE49-F238E27FC236}">
+                <a16:creationId xmlns:a16="http://schemas.microsoft.com/office/drawing/2014/main" id="{D10DDA37-E46B-B641-BC9F-636CB92A2C08}"/>
+              </a:ext>
+            </a:extLst>
+          </p:cNvPr>
+          <p:cNvSpPr>
+            <a:spLocks noGrp="1"/>
+          </p:cNvSpPr>
+          <p:nvPr>
+            <p:ph idx="1"/>
+          </p:nvPr>
+        </p:nvSpPr>
+        <p:spPr/>
+        <p:txBody>
+          <a:bodyPr/>
+          <a:lstStyle/>
+          <a:p>
+            <a:pPr lvl="1"/>
+            <a:r>
+              <a:rPr/>
+              <a:t>we will follow a learning by doing approach</a:t>
+            </a:r>
+          </a:p>
+          <a:p>
+            <a:pPr lvl="1"/>
+            <a:r>
+              <a:rPr/>
+              <a:t>getting you interacting with R early</a:t>
+            </a:r>
+          </a:p>
+          <a:p>
+            <a:pPr lvl="1"/>
+            <a:r>
+              <a:rPr/>
+              <a:t>don’t worry if you don’t understand everything at the start</a:t>
+            </a:r>
+          </a:p>
+          <a:p>
+            <a:pPr lvl="1"/>
+            <a:r>
+              <a:rPr/>
+              <a:t>do feel free to ask us questions at any time</a:t>
+            </a:r>
+          </a:p>
+          <a:p>
+            <a:pPr lvl="0" marL="0" indent="0">
+              <a:buNone/>
+            </a:pPr>
+            <a:r>
+              <a:rPr/>
+              <a:t>I expect to fail to avoid doing these at some point :</a:t>
+            </a:r>
+          </a:p>
+          <a:p>
+            <a:pPr lvl="1">
+              <a:buAutoNum type="alphaLcParenR"/>
+            </a:pPr>
+            <a:r>
+              <a:rPr/>
+              <a:t>assume you know things that you don’t</a:t>
+            </a:r>
+          </a:p>
+          <a:p>
+            <a:pPr lvl="1">
+              <a:buAutoNum type="alphaLcParenR"/>
+            </a:pPr>
+            <a:r>
+              <a:rPr/>
+              <a:t>patronise you by explaining things you already know</a:t>
+            </a:r>
+          </a:p>
+          <a:p>
+            <a:pPr lvl="0" marL="0" indent="0">
+              <a:buNone/>
+            </a:pPr>
+            <a:r>
+              <a:rPr/>
+              <a:t>Please feel free to tell me.</a:t>
+            </a:r>
+          </a:p>
+        </p:txBody>
+      </p:sp>
+    </p:spTree>
+  </p:cSld>
+</p:sld>
+</file>
+
+<file path=ppt/slides/slide8.xml><?xml version="1.0" encoding="utf-8"?>
 <p:sld xmlns:a="http://schemas.openxmlformats.org/drawingml/2006/main" xmlns:r="http://schemas.openxmlformats.org/officeDocument/2006/relationships" xmlns:p="http://schemas.openxmlformats.org/presentationml/2006/main">
   <p:cSld>
     <p:spTree>

</xml_diff>